<commit_message>
update after stephane's suggestion for election
</commit_message>
<xml_diff>
--- a/draft-litkowski-pce-state-sync-02.pptx
+++ b/draft-litkowski-pce-state-sync-02.pptx
@@ -4072,11 +4072,7 @@
             </a:pPr>
             <a:r>
               <a:rPr lang="en-US" sz="2400" dirty="0" smtClean="0"/>
-              <a:t>Solve computation loop/optimality </a:t>
-            </a:r>
-            <a:r>
-              <a:rPr lang="en-US" sz="2400" dirty="0" smtClean="0"/>
-              <a:t>issues for dependent path computations</a:t>
+              <a:t>Solve computation loop/optimality issues for dependent path computations</a:t>
             </a:r>
             <a:r>
               <a:rPr lang="en-US" sz="2400" dirty="0"/>
@@ -4086,7 +4082,6 @@
               <a:rPr lang="en-US" sz="2400" dirty="0" smtClean="0"/>
               <a:t>(for e.g. diversity)</a:t>
             </a:r>
-            <a:endParaRPr lang="en-US" sz="2400" dirty="0" smtClean="0"/>
           </a:p>
           <a:p>
             <a:pPr>
@@ -4095,11 +4090,7 @@
             </a:pPr>
             <a:r>
               <a:rPr lang="en-US" sz="2800" dirty="0" smtClean="0"/>
-              <a:t>Work </a:t>
-            </a:r>
-            <a:r>
-              <a:rPr lang="en-US" sz="2800" dirty="0" smtClean="0"/>
-              <a:t>for all PCE-PCE relationships</a:t>
+              <a:t>Work for all PCE-PCE relationships</a:t>
             </a:r>
           </a:p>
           <a:p>
@@ -4134,11 +4125,7 @@
             </a:pPr>
             <a:r>
               <a:rPr lang="en-IN" sz="2400" dirty="0" smtClean="0"/>
-              <a:t>Hierarchy of </a:t>
-            </a:r>
-            <a:r>
-              <a:rPr lang="en-IN" sz="2400" dirty="0" smtClean="0"/>
-              <a:t>PCEs</a:t>
+              <a:t>Hierarchy of PCEs</a:t>
             </a:r>
           </a:p>
           <a:p>
@@ -4150,7 +4137,6 @@
               <a:rPr lang="en-IN" sz="2800" dirty="0" smtClean="0"/>
               <a:t>Discussed previously in IETF 98 &amp; 97</a:t>
             </a:r>
-            <a:endParaRPr lang="en-IN" sz="2800" dirty="0" smtClean="0"/>
           </a:p>
         </p:txBody>
       </p:sp>
@@ -4357,7 +4343,11 @@
             </a:r>
             <a:r>
               <a:rPr lang="en-US" sz="1800" dirty="0" smtClean="0"/>
-              <a:t>election</a:t>
+              <a:t>election based on priority </a:t>
+            </a:r>
+            <a:r>
+              <a:rPr lang="en-US" sz="1200" dirty="0" smtClean="0"/>
+              <a:t>(how the priority is set/advertised is out of scope)</a:t>
             </a:r>
             <a:endParaRPr lang="en-US" sz="1800" dirty="0" smtClean="0"/>
           </a:p>
@@ -4530,11 +4520,7 @@
             </a:r>
             <a:r>
               <a:rPr lang="en-US" dirty="0" smtClean="0"/>
-              <a:t>How to make sure the “latest” state is synchronized at </a:t>
-            </a:r>
-            <a:r>
-              <a:rPr lang="en-US" dirty="0" smtClean="0"/>
-              <a:t>PCEs in case of learning LSP state from multiple sources?</a:t>
+              <a:t>How to make sure the “latest” state is synchronized at PCEs in case of learning LSP state from multiple sources?</a:t>
             </a:r>
           </a:p>
           <a:p>
@@ -4554,11 +4540,7 @@
             </a:pPr>
             <a:r>
               <a:rPr lang="en-US" dirty="0" smtClean="0"/>
-              <a:t> Use </a:t>
-            </a:r>
-            <a:r>
-              <a:rPr lang="en-US" dirty="0" smtClean="0"/>
-              <a:t>the LSP-DB version number (similar to RFC8232 - state synchronization optimizations)</a:t>
+              <a:t> Use the LSP-DB version number (similar to RFC8232 - state synchronization optimizations)</a:t>
             </a:r>
           </a:p>
           <a:p>
@@ -4572,19 +4554,7 @@
             </a:r>
             <a:r>
               <a:rPr lang="en-US" dirty="0" smtClean="0"/>
-              <a:t>ORIGINAL-LSP-DB-VERSION </a:t>
-            </a:r>
-            <a:r>
-              <a:rPr lang="en-US" dirty="0" smtClean="0"/>
-              <a:t>TLV </a:t>
-            </a:r>
-            <a:r>
-              <a:rPr lang="en-US" dirty="0" smtClean="0"/>
-              <a:t>– which encodes </a:t>
-            </a:r>
-            <a:r>
-              <a:rPr lang="en-US" dirty="0" smtClean="0"/>
-              <a:t>the PCC’s LSP-DB version </a:t>
+              <a:t>ORIGINAL-LSP-DB-VERSION TLV – which encodes the PCC’s LSP-DB version </a:t>
             </a:r>
             <a:r>
               <a:rPr lang="en-US" dirty="0"/>
@@ -4592,11 +4562,7 @@
             </a:r>
             <a:r>
               <a:rPr lang="en-US" dirty="0" smtClean="0"/>
-              <a:t>as received from PCC) on </a:t>
-            </a:r>
-            <a:r>
-              <a:rPr lang="en-US" dirty="0" smtClean="0"/>
-              <a:t>the state-sync PCE sessions</a:t>
+              <a:t>as received from PCC) on the state-sync PCE sessions</a:t>
             </a:r>
           </a:p>
           <a:p>
@@ -4638,11 +4604,7 @@
             </a:pPr>
             <a:r>
               <a:rPr lang="en-US" dirty="0"/>
-              <a:t> </a:t>
-            </a:r>
-            <a:r>
-              <a:rPr lang="en-US" dirty="0"/>
-              <a:t>This ensures that a PCE never tries to update its stored LSP state with an old information.</a:t>
+              <a:t> This ensures that a PCE never tries to update its stored LSP state with an old information.</a:t>
             </a:r>
             <a:endParaRPr lang="en-US" dirty="0" smtClean="0"/>
           </a:p>
@@ -4755,11 +4717,7 @@
           <a:p>
             <a:r>
               <a:rPr lang="en-US" cap="none" dirty="0" smtClean="0"/>
-              <a:t>Updates in -</a:t>
-            </a:r>
-            <a:r>
-              <a:rPr lang="en-US" cap="none" dirty="0" smtClean="0"/>
-              <a:t>02: Latest State!</a:t>
+              <a:t>Updates in -02: Latest State!</a:t>
             </a:r>
             <a:endParaRPr lang="en-IN" cap="none" dirty="0"/>
           </a:p>
@@ -5354,11 +5312,7 @@
           <a:p>
             <a:r>
               <a:rPr lang="en-US" cap="none" dirty="0" smtClean="0"/>
-              <a:t>Updates in -</a:t>
-            </a:r>
-            <a:r>
-              <a:rPr lang="en-US" cap="none" dirty="0" smtClean="0"/>
-              <a:t>02: Latest State!</a:t>
+              <a:t>Updates in -02: Latest State!</a:t>
             </a:r>
             <a:endParaRPr lang="en-IN" cap="none" dirty="0"/>
           </a:p>
@@ -6026,11 +5980,7 @@
           <a:p>
             <a:r>
               <a:rPr lang="en-US" cap="none" dirty="0" smtClean="0"/>
-              <a:t>Updates in -</a:t>
-            </a:r>
-            <a:r>
-              <a:rPr lang="en-US" cap="none" dirty="0" smtClean="0"/>
-              <a:t>02: Latest State!</a:t>
+              <a:t>Updates in -02: Latest State!</a:t>
             </a:r>
             <a:endParaRPr lang="en-IN" cap="none" dirty="0"/>
           </a:p>

</xml_diff>